<commit_message>
Updated Powerpoint Moved Code
</commit_message>
<xml_diff>
--- a/deliverables/slides/803_Presentation_Fasburg_Thomas_Reiff.pptx
+++ b/deliverables/slides/803_Presentation_Fasburg_Thomas_Reiff.pptx
@@ -126,7 +126,7 @@
   </p:defaultTextStyle>
   <p:extLst>
     <p:ext uri="{EFAFB233-063F-42B5-8137-9DF3F51BA10A}">
-      <p15:sldGuideLst xmlns:p15="http://schemas.microsoft.com/office/powerpoint/2012/main" xmlns="">
+      <p15:sldGuideLst xmlns="" xmlns:p15="http://schemas.microsoft.com/office/powerpoint/2012/main">
         <p15:guide id="1" orient="horz" pos="2160">
           <p15:clr>
             <a:srgbClr val="A4A3A4"/>
@@ -2109,7 +2109,7 @@
 <dgm:dataModel xmlns:dgm="http://schemas.openxmlformats.org/drawingml/2006/diagram" xmlns:a="http://schemas.openxmlformats.org/drawingml/2006/main">
   <dgm:ptLst>
     <dgm:pt modelId="{89AD39A8-033A-42C3-8E9C-A240A7F480B6}" type="doc">
-      <dgm:prSet loTypeId="urn:microsoft.com/office/officeart/2005/8/layout/vList2" loCatId="list" qsTypeId="urn:microsoft.com/office/officeart/2005/8/quickstyle/simple1" qsCatId="simple" csTypeId="urn:microsoft.com/office/officeart/2005/8/colors/accent1_2" csCatId="accent1"/>
+      <dgm:prSet loTypeId="urn:microsoft.com/office/officeart/2005/8/layout/vList2" loCatId="list" qsTypeId="urn:microsoft.com/office/officeart/2005/8/quickstyle/simple1" qsCatId="simple" csTypeId="urn:microsoft.com/office/officeart/2005/8/colors/accent1_2" csCatId="accent1" phldr="1"/>
       <dgm:spPr/>
       <dgm:t>
         <a:bodyPr/>
@@ -2176,7 +2176,49 @@
               <a:latin typeface="Arial" panose="020B0604020202020204" pitchFamily="34" charset="0"/>
               <a:cs typeface="Arial" panose="020B0604020202020204" pitchFamily="34" charset="0"/>
             </a:rPr>
-            <a:t>Find N-dimensional mean of each class</a:t>
+            <a:t>Find N-dimensional mean </a:t>
+          </a:r>
+          <a:r>
+            <a:rPr lang="en-US" dirty="0" smtClean="0">
+              <a:latin typeface="Arial" panose="020B0604020202020204" pitchFamily="34" charset="0"/>
+              <a:cs typeface="Arial" panose="020B0604020202020204" pitchFamily="34" charset="0"/>
+            </a:rPr>
+            <a:t>&amp; </a:t>
+          </a:r>
+          <a:r>
+            <a:rPr lang="en-US" dirty="0" err="1" smtClean="0">
+              <a:latin typeface="Arial" panose="020B0604020202020204" pitchFamily="34" charset="0"/>
+              <a:cs typeface="Arial" panose="020B0604020202020204" pitchFamily="34" charset="0"/>
+            </a:rPr>
+            <a:t>std</a:t>
+          </a:r>
+          <a:r>
+            <a:rPr lang="en-US" dirty="0" smtClean="0">
+              <a:latin typeface="Arial" panose="020B0604020202020204" pitchFamily="34" charset="0"/>
+              <a:cs typeface="Arial" panose="020B0604020202020204" pitchFamily="34" charset="0"/>
+            </a:rPr>
+            <a:t> </a:t>
+          </a:r>
+          <a:r>
+            <a:rPr lang="en-US" dirty="0" err="1" smtClean="0">
+              <a:latin typeface="Arial" panose="020B0604020202020204" pitchFamily="34" charset="0"/>
+              <a:cs typeface="Arial" panose="020B0604020202020204" pitchFamily="34" charset="0"/>
+            </a:rPr>
+            <a:t>dev</a:t>
+          </a:r>
+          <a:r>
+            <a:rPr lang="en-US" dirty="0" smtClean="0">
+              <a:latin typeface="Arial" panose="020B0604020202020204" pitchFamily="34" charset="0"/>
+              <a:cs typeface="Arial" panose="020B0604020202020204" pitchFamily="34" charset="0"/>
+            </a:rPr>
+            <a:t> of </a:t>
+          </a:r>
+          <a:r>
+            <a:rPr lang="en-US" dirty="0" smtClean="0">
+              <a:latin typeface="Arial" panose="020B0604020202020204" pitchFamily="34" charset="0"/>
+              <a:cs typeface="Arial" panose="020B0604020202020204" pitchFamily="34" charset="0"/>
+            </a:rPr>
+            <a:t>each class</a:t>
           </a:r>
           <a:endParaRPr lang="en-US" dirty="0">
             <a:latin typeface="Arial" panose="020B0604020202020204" pitchFamily="34" charset="0"/>
@@ -2260,13 +2302,13 @@
         <a:p>
           <a:pPr rtl="0"/>
           <a:r>
-            <a:rPr lang="en-US" smtClean="0">
+            <a:rPr lang="en-US" dirty="0" smtClean="0">
               <a:latin typeface="Arial" panose="020B0604020202020204" pitchFamily="34" charset="0"/>
               <a:cs typeface="Arial" panose="020B0604020202020204" pitchFamily="34" charset="0"/>
             </a:rPr>
-            <a:t>K-Means Clustering</a:t>
+            <a:t>Nearest Mean</a:t>
           </a:r>
-          <a:endParaRPr lang="en-US">
+          <a:endParaRPr lang="en-US" dirty="0">
             <a:latin typeface="Arial" panose="020B0604020202020204" pitchFamily="34" charset="0"/>
             <a:cs typeface="Arial" panose="020B0604020202020204" pitchFamily="34" charset="0"/>
           </a:endParaRPr>
@@ -3240,8 +3282,8 @@
       </dsp:nvSpPr>
       <dsp:spPr>
         <a:xfrm>
-          <a:off x="0" y="49319"/>
-          <a:ext cx="8229600" cy="818999"/>
+          <a:off x="0" y="158736"/>
+          <a:ext cx="8229600" cy="772200"/>
         </a:xfrm>
         <a:prstGeom prst="roundRect">
           <a:avLst/>
@@ -3282,12 +3324,12 @@
         </a:fontRef>
       </dsp:style>
       <dsp:txBody>
-        <a:bodyPr spcFirstLastPara="0" vert="horz" wrap="square" lIns="133350" tIns="133350" rIns="133350" bIns="133350" numCol="1" spcCol="1270" anchor="ctr" anchorCtr="0">
+        <a:bodyPr spcFirstLastPara="0" vert="horz" wrap="square" lIns="125730" tIns="125730" rIns="125730" bIns="125730" numCol="1" spcCol="1270" anchor="ctr" anchorCtr="0">
           <a:noAutofit/>
         </a:bodyPr>
         <a:lstStyle/>
         <a:p>
-          <a:pPr lvl="0" algn="l" defTabSz="1555750" rtl="0">
+          <a:pPr lvl="0" algn="l" defTabSz="1466850" rtl="0">
             <a:lnSpc>
               <a:spcPct val="90000"/>
             </a:lnSpc>
@@ -3299,21 +3341,21 @@
             </a:spcAft>
           </a:pPr>
           <a:r>
-            <a:rPr lang="en-US" sz="3500" kern="1200" smtClean="0">
+            <a:rPr lang="en-US" sz="3300" kern="1200" smtClean="0">
               <a:latin typeface="Arial" panose="020B0604020202020204" pitchFamily="34" charset="0"/>
               <a:cs typeface="Arial" panose="020B0604020202020204" pitchFamily="34" charset="0"/>
             </a:rPr>
             <a:t>Training</a:t>
           </a:r>
-          <a:endParaRPr lang="en-US" sz="3500" kern="1200">
+          <a:endParaRPr lang="en-US" sz="3300" kern="1200">
             <a:latin typeface="Arial" panose="020B0604020202020204" pitchFamily="34" charset="0"/>
             <a:cs typeface="Arial" panose="020B0604020202020204" pitchFamily="34" charset="0"/>
           </a:endParaRPr>
         </a:p>
       </dsp:txBody>
       <dsp:txXfrm>
-        <a:off x="39980" y="89299"/>
-        <a:ext cx="8149640" cy="739039"/>
+        <a:off x="37696" y="196432"/>
+        <a:ext cx="8154208" cy="696808"/>
       </dsp:txXfrm>
     </dsp:sp>
     <dsp:sp modelId="{09BB81D5-4EF3-4B5E-A23A-812D61905779}">
@@ -3323,8 +3365,8 @@
       </dsp:nvSpPr>
       <dsp:spPr>
         <a:xfrm>
-          <a:off x="0" y="868319"/>
-          <a:ext cx="8229600" cy="579600"/>
+          <a:off x="0" y="930936"/>
+          <a:ext cx="8229600" cy="546480"/>
         </a:xfrm>
         <a:prstGeom prst="rect">
           <a:avLst/>
@@ -3348,12 +3390,12 @@
         <a:fontRef idx="minor"/>
       </dsp:style>
       <dsp:txBody>
-        <a:bodyPr spcFirstLastPara="0" vert="horz" wrap="square" lIns="261290" tIns="44450" rIns="248920" bIns="44450" numCol="1" spcCol="1270" anchor="t" anchorCtr="0">
+        <a:bodyPr spcFirstLastPara="0" vert="horz" wrap="square" lIns="261290" tIns="41910" rIns="234696" bIns="41910" numCol="1" spcCol="1270" anchor="t" anchorCtr="0">
           <a:noAutofit/>
         </a:bodyPr>
         <a:lstStyle/>
         <a:p>
-          <a:pPr marL="228600" lvl="1" indent="-228600" algn="l" defTabSz="1200150" rtl="0">
+          <a:pPr marL="228600" lvl="1" indent="-228600" algn="l" defTabSz="1155700" rtl="0">
             <a:lnSpc>
               <a:spcPct val="90000"/>
             </a:lnSpc>
@@ -3366,21 +3408,63 @@
             <a:buChar char="••"/>
           </a:pPr>
           <a:r>
-            <a:rPr lang="en-US" sz="2700" kern="1200" dirty="0" smtClean="0">
+            <a:rPr lang="en-US" sz="2600" kern="1200" dirty="0" smtClean="0">
               <a:latin typeface="Arial" panose="020B0604020202020204" pitchFamily="34" charset="0"/>
               <a:cs typeface="Arial" panose="020B0604020202020204" pitchFamily="34" charset="0"/>
             </a:rPr>
-            <a:t>Find N-dimensional mean of each class</a:t>
+            <a:t>Find N-dimensional mean </a:t>
           </a:r>
-          <a:endParaRPr lang="en-US" sz="2700" kern="1200" dirty="0">
+          <a:r>
+            <a:rPr lang="en-US" sz="2600" kern="1200" dirty="0" smtClean="0">
+              <a:latin typeface="Arial" panose="020B0604020202020204" pitchFamily="34" charset="0"/>
+              <a:cs typeface="Arial" panose="020B0604020202020204" pitchFamily="34" charset="0"/>
+            </a:rPr>
+            <a:t>&amp; </a:t>
+          </a:r>
+          <a:r>
+            <a:rPr lang="en-US" sz="2600" kern="1200" dirty="0" err="1" smtClean="0">
+              <a:latin typeface="Arial" panose="020B0604020202020204" pitchFamily="34" charset="0"/>
+              <a:cs typeface="Arial" panose="020B0604020202020204" pitchFamily="34" charset="0"/>
+            </a:rPr>
+            <a:t>std</a:t>
+          </a:r>
+          <a:r>
+            <a:rPr lang="en-US" sz="2600" kern="1200" dirty="0" smtClean="0">
+              <a:latin typeface="Arial" panose="020B0604020202020204" pitchFamily="34" charset="0"/>
+              <a:cs typeface="Arial" panose="020B0604020202020204" pitchFamily="34" charset="0"/>
+            </a:rPr>
+            <a:t> </a:t>
+          </a:r>
+          <a:r>
+            <a:rPr lang="en-US" sz="2600" kern="1200" dirty="0" err="1" smtClean="0">
+              <a:latin typeface="Arial" panose="020B0604020202020204" pitchFamily="34" charset="0"/>
+              <a:cs typeface="Arial" panose="020B0604020202020204" pitchFamily="34" charset="0"/>
+            </a:rPr>
+            <a:t>dev</a:t>
+          </a:r>
+          <a:r>
+            <a:rPr lang="en-US" sz="2600" kern="1200" dirty="0" smtClean="0">
+              <a:latin typeface="Arial" panose="020B0604020202020204" pitchFamily="34" charset="0"/>
+              <a:cs typeface="Arial" panose="020B0604020202020204" pitchFamily="34" charset="0"/>
+            </a:rPr>
+            <a:t> of </a:t>
+          </a:r>
+          <a:r>
+            <a:rPr lang="en-US" sz="2600" kern="1200" dirty="0" smtClean="0">
+              <a:latin typeface="Arial" panose="020B0604020202020204" pitchFamily="34" charset="0"/>
+              <a:cs typeface="Arial" panose="020B0604020202020204" pitchFamily="34" charset="0"/>
+            </a:rPr>
+            <a:t>each class</a:t>
+          </a:r>
+          <a:endParaRPr lang="en-US" sz="2600" kern="1200" dirty="0">
             <a:latin typeface="Arial" panose="020B0604020202020204" pitchFamily="34" charset="0"/>
             <a:cs typeface="Arial" panose="020B0604020202020204" pitchFamily="34" charset="0"/>
           </a:endParaRPr>
         </a:p>
       </dsp:txBody>
       <dsp:txXfrm>
-        <a:off x="0" y="868319"/>
-        <a:ext cx="8229600" cy="579600"/>
+        <a:off x="0" y="930936"/>
+        <a:ext cx="8229600" cy="546480"/>
       </dsp:txXfrm>
     </dsp:sp>
     <dsp:sp modelId="{ADF7AE22-5AB6-4652-9D04-B2F8740234A9}">
@@ -3390,8 +3474,8 @@
       </dsp:nvSpPr>
       <dsp:spPr>
         <a:xfrm>
-          <a:off x="0" y="1447918"/>
-          <a:ext cx="8229600" cy="818999"/>
+          <a:off x="0" y="1477416"/>
+          <a:ext cx="8229600" cy="772200"/>
         </a:xfrm>
         <a:prstGeom prst="roundRect">
           <a:avLst/>
@@ -3432,12 +3516,12 @@
         </a:fontRef>
       </dsp:style>
       <dsp:txBody>
-        <a:bodyPr spcFirstLastPara="0" vert="horz" wrap="square" lIns="133350" tIns="133350" rIns="133350" bIns="133350" numCol="1" spcCol="1270" anchor="ctr" anchorCtr="0">
+        <a:bodyPr spcFirstLastPara="0" vert="horz" wrap="square" lIns="125730" tIns="125730" rIns="125730" bIns="125730" numCol="1" spcCol="1270" anchor="ctr" anchorCtr="0">
           <a:noAutofit/>
         </a:bodyPr>
         <a:lstStyle/>
         <a:p>
-          <a:pPr lvl="0" algn="l" defTabSz="1555750" rtl="0">
+          <a:pPr lvl="0" algn="l" defTabSz="1466850" rtl="0">
             <a:lnSpc>
               <a:spcPct val="90000"/>
             </a:lnSpc>
@@ -3449,21 +3533,21 @@
             </a:spcAft>
           </a:pPr>
           <a:r>
-            <a:rPr lang="en-US" sz="3500" kern="1200" smtClean="0">
+            <a:rPr lang="en-US" sz="3300" kern="1200" smtClean="0">
               <a:latin typeface="Arial" panose="020B0604020202020204" pitchFamily="34" charset="0"/>
               <a:cs typeface="Arial" panose="020B0604020202020204" pitchFamily="34" charset="0"/>
             </a:rPr>
             <a:t>Testing</a:t>
           </a:r>
-          <a:endParaRPr lang="en-US" sz="3500" kern="1200">
+          <a:endParaRPr lang="en-US" sz="3300" kern="1200">
             <a:latin typeface="Arial" panose="020B0604020202020204" pitchFamily="34" charset="0"/>
             <a:cs typeface="Arial" panose="020B0604020202020204" pitchFamily="34" charset="0"/>
           </a:endParaRPr>
         </a:p>
       </dsp:txBody>
       <dsp:txXfrm>
-        <a:off x="39980" y="1487898"/>
-        <a:ext cx="8149640" cy="739039"/>
+        <a:off x="37696" y="1515112"/>
+        <a:ext cx="8154208" cy="696808"/>
       </dsp:txXfrm>
     </dsp:sp>
     <dsp:sp modelId="{23655599-5F59-49D3-B74B-3CFA1652679D}">
@@ -3473,8 +3557,8 @@
       </dsp:nvSpPr>
       <dsp:spPr>
         <a:xfrm>
-          <a:off x="0" y="2266919"/>
-          <a:ext cx="8229600" cy="2209725"/>
+          <a:off x="0" y="2249616"/>
+          <a:ext cx="8229600" cy="2117610"/>
         </a:xfrm>
         <a:prstGeom prst="rect">
           <a:avLst/>
@@ -3498,12 +3582,12 @@
         <a:fontRef idx="minor"/>
       </dsp:style>
       <dsp:txBody>
-        <a:bodyPr spcFirstLastPara="0" vert="horz" wrap="square" lIns="261290" tIns="44450" rIns="248920" bIns="44450" numCol="1" spcCol="1270" anchor="t" anchorCtr="0">
+        <a:bodyPr spcFirstLastPara="0" vert="horz" wrap="square" lIns="261290" tIns="41910" rIns="234696" bIns="41910" numCol="1" spcCol="1270" anchor="t" anchorCtr="0">
           <a:noAutofit/>
         </a:bodyPr>
         <a:lstStyle/>
         <a:p>
-          <a:pPr marL="228600" lvl="1" indent="-228600" algn="l" defTabSz="1200150" rtl="0">
+          <a:pPr marL="228600" lvl="1" indent="-228600" algn="l" defTabSz="1155700" rtl="0">
             <a:lnSpc>
               <a:spcPct val="90000"/>
             </a:lnSpc>
@@ -3516,19 +3600,19 @@
             <a:buChar char="••"/>
           </a:pPr>
           <a:r>
-            <a:rPr lang="en-US" sz="2700" kern="1200" smtClean="0">
+            <a:rPr lang="en-US" sz="2600" kern="1200" dirty="0" smtClean="0">
               <a:latin typeface="Arial" panose="020B0604020202020204" pitchFamily="34" charset="0"/>
               <a:cs typeface="Arial" panose="020B0604020202020204" pitchFamily="34" charset="0"/>
             </a:rPr>
-            <a:t>K-Means Clustering</a:t>
+            <a:t>Nearest Mean</a:t>
           </a:r>
-          <a:endParaRPr lang="en-US" sz="2700" kern="1200">
+          <a:endParaRPr lang="en-US" sz="2600" kern="1200" dirty="0">
             <a:latin typeface="Arial" panose="020B0604020202020204" pitchFamily="34" charset="0"/>
             <a:cs typeface="Arial" panose="020B0604020202020204" pitchFamily="34" charset="0"/>
           </a:endParaRPr>
         </a:p>
         <a:p>
-          <a:pPr marL="457200" lvl="2" indent="-228600" algn="l" defTabSz="1200150" rtl="0">
+          <a:pPr marL="457200" lvl="2" indent="-228600" algn="l" defTabSz="1155700" rtl="0">
             <a:lnSpc>
               <a:spcPct val="90000"/>
             </a:lnSpc>
@@ -3541,19 +3625,19 @@
             <a:buChar char="••"/>
           </a:pPr>
           <a:r>
-            <a:rPr lang="en-US" sz="2700" kern="1200" smtClean="0">
+            <a:rPr lang="en-US" sz="2600" kern="1200" smtClean="0">
               <a:latin typeface="Arial" panose="020B0604020202020204" pitchFamily="34" charset="0"/>
               <a:cs typeface="Arial" panose="020B0604020202020204" pitchFamily="34" charset="0"/>
             </a:rPr>
             <a:t>Dist scaled by std dev of each dimension</a:t>
           </a:r>
-          <a:endParaRPr lang="en-US" sz="2700" kern="1200">
+          <a:endParaRPr lang="en-US" sz="2600" kern="1200">
             <a:latin typeface="Arial" panose="020B0604020202020204" pitchFamily="34" charset="0"/>
             <a:cs typeface="Arial" panose="020B0604020202020204" pitchFamily="34" charset="0"/>
           </a:endParaRPr>
         </a:p>
         <a:p>
-          <a:pPr marL="457200" lvl="2" indent="-228600" algn="l" defTabSz="1200150" rtl="0">
+          <a:pPr marL="457200" lvl="2" indent="-228600" algn="l" defTabSz="1155700" rtl="0">
             <a:lnSpc>
               <a:spcPct val="90000"/>
             </a:lnSpc>
@@ -3566,26 +3650,26 @@
             <a:buChar char="••"/>
           </a:pPr>
           <a:r>
-            <a:rPr lang="en-US" sz="2700" kern="1200" dirty="0" err="1" smtClean="0">
+            <a:rPr lang="en-US" sz="2600" kern="1200" dirty="0" err="1" smtClean="0">
               <a:latin typeface="Arial" panose="020B0604020202020204" pitchFamily="34" charset="0"/>
               <a:cs typeface="Arial" panose="020B0604020202020204" pitchFamily="34" charset="0"/>
             </a:rPr>
             <a:t>Dist</a:t>
           </a:r>
           <a:r>
-            <a:rPr lang="en-US" sz="2700" kern="1200" dirty="0" smtClean="0">
+            <a:rPr lang="en-US" sz="2600" kern="1200" dirty="0" smtClean="0">
               <a:latin typeface="Arial" panose="020B0604020202020204" pitchFamily="34" charset="0"/>
               <a:cs typeface="Arial" panose="020B0604020202020204" pitchFamily="34" charset="0"/>
             </a:rPr>
             <a:t> scaled to normalize dimension ranges</a:t>
           </a:r>
-          <a:endParaRPr lang="en-US" sz="2700" kern="1200" dirty="0">
+          <a:endParaRPr lang="en-US" sz="2600" kern="1200" dirty="0">
             <a:latin typeface="Arial" panose="020B0604020202020204" pitchFamily="34" charset="0"/>
             <a:cs typeface="Arial" panose="020B0604020202020204" pitchFamily="34" charset="0"/>
           </a:endParaRPr>
         </a:p>
         <a:p>
-          <a:pPr marL="228600" lvl="1" indent="-228600" algn="l" defTabSz="1200150" rtl="0">
+          <a:pPr marL="228600" lvl="1" indent="-228600" algn="l" defTabSz="1155700" rtl="0">
             <a:lnSpc>
               <a:spcPct val="90000"/>
             </a:lnSpc>
@@ -3598,19 +3682,19 @@
             <a:buChar char="••"/>
           </a:pPr>
           <a:r>
-            <a:rPr lang="en-US" sz="2700" kern="1200" smtClean="0">
+            <a:rPr lang="en-US" sz="2600" kern="1200" smtClean="0">
               <a:latin typeface="Arial" panose="020B0604020202020204" pitchFamily="34" charset="0"/>
               <a:cs typeface="Arial" panose="020B0604020202020204" pitchFamily="34" charset="0"/>
             </a:rPr>
             <a:t>Manually tuned weights by feature</a:t>
           </a:r>
-          <a:endParaRPr lang="en-US" sz="2700" kern="1200">
+          <a:endParaRPr lang="en-US" sz="2600" kern="1200">
             <a:latin typeface="Arial" panose="020B0604020202020204" pitchFamily="34" charset="0"/>
             <a:cs typeface="Arial" panose="020B0604020202020204" pitchFamily="34" charset="0"/>
           </a:endParaRPr>
         </a:p>
         <a:p>
-          <a:pPr marL="457200" lvl="2" indent="-228600" algn="l" defTabSz="1200150" rtl="0">
+          <a:pPr marL="457200" lvl="2" indent="-228600" algn="l" defTabSz="1155700" rtl="0">
             <a:lnSpc>
               <a:spcPct val="90000"/>
             </a:lnSpc>
@@ -3623,21 +3707,21 @@
             <a:buChar char="••"/>
           </a:pPr>
           <a:r>
-            <a:rPr lang="en-US" sz="2700" kern="1200" dirty="0" smtClean="0">
+            <a:rPr lang="en-US" sz="2600" kern="1200" dirty="0" smtClean="0">
               <a:latin typeface="Arial" panose="020B0604020202020204" pitchFamily="34" charset="0"/>
               <a:cs typeface="Arial" panose="020B0604020202020204" pitchFamily="34" charset="0"/>
             </a:rPr>
             <a:t>More weight to more important features</a:t>
           </a:r>
-          <a:endParaRPr lang="en-US" sz="2700" kern="1200" dirty="0">
+          <a:endParaRPr lang="en-US" sz="2600" kern="1200" dirty="0">
             <a:latin typeface="Arial" panose="020B0604020202020204" pitchFamily="34" charset="0"/>
             <a:cs typeface="Arial" panose="020B0604020202020204" pitchFamily="34" charset="0"/>
           </a:endParaRPr>
         </a:p>
       </dsp:txBody>
       <dsp:txXfrm>
-        <a:off x="0" y="2266919"/>
-        <a:ext cx="8229600" cy="2209725"/>
+        <a:off x="0" y="2249616"/>
+        <a:ext cx="8229600" cy="2117610"/>
       </dsp:txXfrm>
     </dsp:sp>
   </dsp:spTree>
@@ -13581,7 +13665,7 @@
             <p:ph idx="1"/>
             <p:extLst>
               <p:ext uri="{D42A27DB-BD31-4B8C-83A1-F6EECF244321}">
-                <p14:modId xmlns:p14="http://schemas.microsoft.com/office/powerpoint/2010/main" val="2290513897"/>
+                <p14:modId xmlns:p14="http://schemas.microsoft.com/office/powerpoint/2010/main" val="3108861571"/>
               </p:ext>
             </p:extLst>
           </p:nvPr>
@@ -13763,11 +13847,11 @@
               <a:t>Testing Images – More complicated backgrounds, shadows, multiple objects, </a:t>
             </a:r>
             <a:r>
-              <a:rPr lang="en-US" sz="2300" dirty="0" err="1" smtClean="0">
+              <a:rPr lang="en-US" sz="2300" dirty="0" smtClean="0">
                 <a:latin typeface="Arial" panose="020B0604020202020204" pitchFamily="34" charset="0"/>
                 <a:cs typeface="Arial" panose="020B0604020202020204" pitchFamily="34" charset="0"/>
               </a:rPr>
-              <a:t>etc</a:t>
+              <a:t>etc.</a:t>
             </a:r>
             <a:endParaRPr lang="en-US" sz="2300" dirty="0" smtClean="0">
               <a:latin typeface="Arial" panose="020B0604020202020204" pitchFamily="34" charset="0"/>
@@ -16052,7 +16136,21 @@
                 <a:latin typeface="Arial" panose="020B0604020202020204" pitchFamily="34" charset="0"/>
                 <a:cs typeface="Arial" panose="020B0604020202020204" pitchFamily="34" charset="0"/>
               </a:rPr>
-              <a:t>Performance of feature calculations limited by foreground </a:t>
+              <a:t>Performance of </a:t>
+            </a:r>
+            <a:r>
+              <a:rPr lang="en-US" dirty="0" smtClean="0">
+                <a:latin typeface="Arial" panose="020B0604020202020204" pitchFamily="34" charset="0"/>
+                <a:cs typeface="Arial" panose="020B0604020202020204" pitchFamily="34" charset="0"/>
+              </a:rPr>
+              <a:t>feature </a:t>
+            </a:r>
+            <a:r>
+              <a:rPr lang="en-US" dirty="0">
+                <a:latin typeface="Arial" panose="020B0604020202020204" pitchFamily="34" charset="0"/>
+                <a:cs typeface="Arial" panose="020B0604020202020204" pitchFamily="34" charset="0"/>
+              </a:rPr>
+              <a:t>calculations limited by foreground </a:t>
             </a:r>
             <a:r>
               <a:rPr lang="en-US" dirty="0" smtClean="0">
@@ -16084,7 +16182,14 @@
                 <a:latin typeface="Arial" panose="020B0604020202020204" pitchFamily="34" charset="0"/>
                 <a:cs typeface="Arial" panose="020B0604020202020204" pitchFamily="34" charset="0"/>
               </a:rPr>
-              <a:t>Decision tree-like structure instead of using means and standard deviations of image classes from training</a:t>
+              <a:t>Decision </a:t>
+            </a:r>
+            <a:r>
+              <a:rPr lang="en-US" dirty="0" smtClean="0">
+                <a:latin typeface="Arial" panose="020B0604020202020204" pitchFamily="34" charset="0"/>
+                <a:cs typeface="Arial" panose="020B0604020202020204" pitchFamily="34" charset="0"/>
+              </a:rPr>
+              <a:t>tree structure</a:t>
             </a:r>
           </a:p>
           <a:p>
@@ -16094,7 +16199,7 @@
                 <a:latin typeface="Arial" panose="020B0604020202020204" pitchFamily="34" charset="0"/>
                 <a:cs typeface="Arial" panose="020B0604020202020204" pitchFamily="34" charset="0"/>
               </a:rPr>
-              <a:t>Addition of a reject class for images determined to not belong to any of the recognized classes</a:t>
+              <a:t>Reject class for unrecognized images</a:t>
             </a:r>
             <a:endParaRPr lang="en-US" dirty="0">
               <a:latin typeface="Arial" panose="020B0604020202020204" pitchFamily="34" charset="0"/>
@@ -16182,8 +16287,12 @@
                 <a:latin typeface="Arial" panose="020B0604020202020204" pitchFamily="34" charset="0"/>
                 <a:cs typeface="Arial" panose="020B0604020202020204" pitchFamily="34" charset="0"/>
               </a:rPr>
-              <a:t>Interactions of various parts of the system need to be tested in addition to testing the parts themselves</a:t>
+              <a:t>More complex analysis is not always better</a:t>
             </a:r>
+            <a:endParaRPr lang="en-US" dirty="0" smtClean="0">
+              <a:latin typeface="Arial" panose="020B0604020202020204" pitchFamily="34" charset="0"/>
+              <a:cs typeface="Arial" panose="020B0604020202020204" pitchFamily="34" charset="0"/>
+            </a:endParaRPr>
           </a:p>
           <a:p>
             <a:r>
@@ -16191,16 +16300,41 @@
                 <a:latin typeface="Arial" panose="020B0604020202020204" pitchFamily="34" charset="0"/>
                 <a:cs typeface="Arial" panose="020B0604020202020204" pitchFamily="34" charset="0"/>
               </a:rPr>
-              <a:t>Importance of the quality of the training and validation system</a:t>
+              <a:t>Quality of </a:t>
             </a:r>
-          </a:p>
-          <a:p>
             <a:r>
               <a:rPr lang="en-US" dirty="0" smtClean="0">
                 <a:latin typeface="Arial" panose="020B0604020202020204" pitchFamily="34" charset="0"/>
                 <a:cs typeface="Arial" panose="020B0604020202020204" pitchFamily="34" charset="0"/>
               </a:rPr>
-              <a:t>Teaching a computer what we understand from visual input is hard!</a:t>
+              <a:t>the </a:t>
+            </a:r>
+            <a:r>
+              <a:rPr lang="en-US" dirty="0" smtClean="0">
+                <a:latin typeface="Arial" panose="020B0604020202020204" pitchFamily="34" charset="0"/>
+                <a:cs typeface="Arial" panose="020B0604020202020204" pitchFamily="34" charset="0"/>
+              </a:rPr>
+              <a:t>training database is very important</a:t>
+            </a:r>
+            <a:endParaRPr lang="en-US" dirty="0" smtClean="0">
+              <a:latin typeface="Arial" panose="020B0604020202020204" pitchFamily="34" charset="0"/>
+              <a:cs typeface="Arial" panose="020B0604020202020204" pitchFamily="34" charset="0"/>
+            </a:endParaRPr>
+          </a:p>
+          <a:p>
+            <a:r>
+              <a:rPr lang="en-US" dirty="0" smtClean="0">
+                <a:latin typeface="Arial" panose="020B0604020202020204" pitchFamily="34" charset="0"/>
+                <a:cs typeface="Arial" panose="020B0604020202020204" pitchFamily="34" charset="0"/>
+              </a:rPr>
+              <a:t>Teaching a computer what we understand from visual input is hard</a:t>
+            </a:r>
+            <a:r>
+              <a:rPr lang="en-US" dirty="0" smtClean="0">
+                <a:latin typeface="Arial" panose="020B0604020202020204" pitchFamily="34" charset="0"/>
+                <a:cs typeface="Arial" panose="020B0604020202020204" pitchFamily="34" charset="0"/>
+              </a:rPr>
+              <a:t>!</a:t>
             </a:r>
             <a:endParaRPr lang="en-US" dirty="0">
               <a:latin typeface="Arial" panose="020B0604020202020204" pitchFamily="34" charset="0"/>
@@ -17490,16 +17624,58 @@
                 <a:latin typeface="Arial" panose="020B0604020202020204" pitchFamily="34" charset="0"/>
                 <a:cs typeface="Arial" panose="020B0604020202020204" pitchFamily="34" charset="0"/>
               </a:rPr>
-              <a:t>Histogram binned by I values from HSI image</a:t>
+              <a:t>Histogram binned by </a:t>
             </a:r>
-          </a:p>
-          <a:p>
             <a:r>
               <a:rPr lang="en-US" dirty="0" smtClean="0">
                 <a:latin typeface="Arial" panose="020B0604020202020204" pitchFamily="34" charset="0"/>
                 <a:cs typeface="Arial" panose="020B0604020202020204" pitchFamily="34" charset="0"/>
               </a:rPr>
-              <a:t>Each pixel adds value (H * S) to histogram</a:t>
+              <a:t>H </a:t>
+            </a:r>
+            <a:r>
+              <a:rPr lang="en-US" dirty="0" smtClean="0">
+                <a:latin typeface="Arial" panose="020B0604020202020204" pitchFamily="34" charset="0"/>
+                <a:cs typeface="Arial" panose="020B0604020202020204" pitchFamily="34" charset="0"/>
+              </a:rPr>
+              <a:t>values from HSI image</a:t>
+            </a:r>
+          </a:p>
+          <a:p>
+            <a:r>
+              <a:rPr lang="en-US" dirty="0" smtClean="0">
+                <a:latin typeface="Arial" panose="020B0604020202020204" pitchFamily="34" charset="0"/>
+                <a:cs typeface="Arial" panose="020B0604020202020204" pitchFamily="34" charset="0"/>
+              </a:rPr>
+              <a:t>Each pixel adds value </a:t>
+            </a:r>
+            <a:r>
+              <a:rPr lang="en-US" dirty="0" smtClean="0">
+                <a:latin typeface="Arial" panose="020B0604020202020204" pitchFamily="34" charset="0"/>
+                <a:cs typeface="Arial" panose="020B0604020202020204" pitchFamily="34" charset="0"/>
+              </a:rPr>
+              <a:t>(S </a:t>
+            </a:r>
+            <a:r>
+              <a:rPr lang="en-US" dirty="0" smtClean="0">
+                <a:latin typeface="Arial" panose="020B0604020202020204" pitchFamily="34" charset="0"/>
+                <a:cs typeface="Arial" panose="020B0604020202020204" pitchFamily="34" charset="0"/>
+              </a:rPr>
+              <a:t>* </a:t>
+            </a:r>
+            <a:r>
+              <a:rPr lang="en-US" dirty="0" smtClean="0">
+                <a:latin typeface="Arial" panose="020B0604020202020204" pitchFamily="34" charset="0"/>
+                <a:cs typeface="Arial" panose="020B0604020202020204" pitchFamily="34" charset="0"/>
+              </a:rPr>
+              <a:t>I) </a:t>
+            </a:r>
+            <a:r>
+              <a:rPr lang="en-US" dirty="0" smtClean="0">
+                <a:latin typeface="Arial" panose="020B0604020202020204" pitchFamily="34" charset="0"/>
+                <a:cs typeface="Arial" panose="020B0604020202020204" pitchFamily="34" charset="0"/>
+              </a:rPr>
+              <a:t>to histogram</a:t>
             </a:r>
           </a:p>
           <a:p>
@@ -18441,10 +18617,6 @@
               </a:rPr>
               <a:t>Experimental Result: insignificant difference from the original method</a:t>
             </a:r>
-            <a:endParaRPr lang="en-US" dirty="0">
-              <a:latin typeface="Arial" panose="020B0604020202020204" pitchFamily="34" charset="0"/>
-              <a:cs typeface="Arial" panose="020B0604020202020204" pitchFamily="34" charset="0"/>
-            </a:endParaRPr>
           </a:p>
           <a:p>
             <a:pPr lvl="1"/>
@@ -19214,7 +19386,7 @@
         </p:blipFill>
         <p:spPr bwMode="auto">
           <a:xfrm>
-            <a:off x="609600" y="3466767"/>
+            <a:off x="609599" y="3286293"/>
             <a:ext cx="1117537" cy="800433"/>
           </a:xfrm>
           <a:prstGeom prst="rect">
@@ -19255,7 +19427,7 @@
         </p:blipFill>
         <p:spPr bwMode="auto">
           <a:xfrm>
-            <a:off x="2488355" y="4343400"/>
+            <a:off x="2488354" y="4162926"/>
             <a:ext cx="1245445" cy="998621"/>
           </a:xfrm>
           <a:prstGeom prst="rect">
@@ -19370,7 +19542,7 @@
         </p:blipFill>
         <p:spPr bwMode="auto">
           <a:xfrm>
-            <a:off x="920056" y="4958656"/>
+            <a:off x="920055" y="4778182"/>
             <a:ext cx="1213544" cy="1213544"/>
           </a:xfrm>
           <a:prstGeom prst="rect">

</xml_diff>